<commit_message>
new:dev: make sure all files are committed
</commit_message>
<xml_diff>
--- a/images/nist-devops.pptx
+++ b/images/nist-devops.pptx
@@ -4820,25 +4820,25 @@
     </dgm:pt>
   </dgm:ptLst>
   <dgm:cxnLst>
-    <dgm:cxn modelId="{E915C8B1-60E4-6445-A078-D967E313A794}" type="presOf" srcId="{F2AA9E6C-32D4-E143-B4C1-8323F5885693}" destId="{698B8BAB-0490-4D42-8916-57106E38A5E6}" srcOrd="0" destOrd="0" presId="urn:microsoft.com/office/officeart/2005/8/layout/cycle6"/>
-    <dgm:cxn modelId="{D8C89E1E-B693-CF46-B777-659EA7D008D5}" srcId="{F2AA9E6C-32D4-E143-B4C1-8323F5885693}" destId="{1C9AF31C-6701-294A-8523-64A8E647FBC5}" srcOrd="4" destOrd="0" parTransId="{6F6B9BF6-FAB3-F64A-B99C-E2674A2FB6F3}" sibTransId="{5DF77001-9AAE-C74E-8FCC-76A47D898C55}"/>
-    <dgm:cxn modelId="{F8CA60E5-7720-0343-8D64-5641EBAFD148}" type="presOf" srcId="{884FC63A-8684-A946-8A4D-9A97E9DECCD5}" destId="{2795BB30-447C-9B46-9F86-B12019B65932}" srcOrd="0" destOrd="0" presId="urn:microsoft.com/office/officeart/2005/8/layout/cycle6"/>
-    <dgm:cxn modelId="{08BC1C92-A07E-824A-8F16-5DCDB7D35E19}" type="presOf" srcId="{CFD1D5B7-A236-4148-A257-4F15376180F1}" destId="{60876D31-8141-E546-B35B-C21A6BE94BFE}" srcOrd="0" destOrd="0" presId="urn:microsoft.com/office/officeart/2005/8/layout/cycle6"/>
-    <dgm:cxn modelId="{379BB9B3-7645-7D47-9759-6DB624EA39E8}" type="presOf" srcId="{3E4B078D-2B88-F24A-983B-7E3B1DA39EA8}" destId="{3D9EF82D-0041-DC49-8628-3E721199BA89}" srcOrd="0" destOrd="0" presId="urn:microsoft.com/office/officeart/2005/8/layout/cycle6"/>
-    <dgm:cxn modelId="{901C4254-49CF-5C41-A3D3-41DBAEF09077}" srcId="{F2AA9E6C-32D4-E143-B4C1-8323F5885693}" destId="{21D29210-83AD-4144-90F7-E799EA922D66}" srcOrd="5" destOrd="0" parTransId="{7EB2BD94-4CD1-3049-9702-ACA060C2840E}" sibTransId="{00C2C499-F023-9C4B-ABEE-1A521DB4A7DD}"/>
-    <dgm:cxn modelId="{E0DC473E-12E2-8640-82E5-D779140A50FC}" type="presOf" srcId="{34B8F909-BE72-3641-B716-D95BA06B7D24}" destId="{5F76135B-3823-414A-B176-155A5F4EA279}" srcOrd="0" destOrd="0" presId="urn:microsoft.com/office/officeart/2005/8/layout/cycle6"/>
-    <dgm:cxn modelId="{84DD6098-914F-3640-8F07-79AF5C97FFA1}" type="presOf" srcId="{21D29210-83AD-4144-90F7-E799EA922D66}" destId="{33B66A95-5460-5149-96FC-9F90C0DE0FB7}" srcOrd="0" destOrd="0" presId="urn:microsoft.com/office/officeart/2005/8/layout/cycle6"/>
-    <dgm:cxn modelId="{FF646128-7C1A-B741-B224-FA3107D25185}" type="presOf" srcId="{00C2C499-F023-9C4B-ABEE-1A521DB4A7DD}" destId="{1F11EC56-0728-F04D-A48B-B5D87E7476EF}" srcOrd="0" destOrd="0" presId="urn:microsoft.com/office/officeart/2005/8/layout/cycle6"/>
     <dgm:cxn modelId="{90FB996F-FC16-B249-9EB3-6F44443E32D5}" type="presOf" srcId="{1C9AF31C-6701-294A-8523-64A8E647FBC5}" destId="{6A6FF06C-7BCC-B743-B2ED-8BA2C5240519}" srcOrd="0" destOrd="0" presId="urn:microsoft.com/office/officeart/2005/8/layout/cycle6"/>
     <dgm:cxn modelId="{DDCAA909-1A99-1842-9DFC-6DE3BAC9D28C}" type="presOf" srcId="{69112F31-8EA7-934A-94C2-F9C45529A03A}" destId="{6A8ACD90-E6D4-4947-8A9F-9E401BBC524F}" srcOrd="0" destOrd="0" presId="urn:microsoft.com/office/officeart/2005/8/layout/cycle6"/>
-    <dgm:cxn modelId="{9598BADE-3C95-B042-A6AE-D841CCC53126}" srcId="{F2AA9E6C-32D4-E143-B4C1-8323F5885693}" destId="{CFD1D5B7-A236-4148-A257-4F15376180F1}" srcOrd="2" destOrd="0" parTransId="{583F1E4E-A41E-244D-8F1A-CD23F3DA4963}" sibTransId="{8F6A9027-1016-0E48-8D2C-387C4E6425C1}"/>
-    <dgm:cxn modelId="{5BA835BF-70E1-2A48-9128-148874E04563}" type="presOf" srcId="{F9B230ED-6196-744A-9501-511F0AF26565}" destId="{22C0D86C-105D-8F40-8CF5-ABBDD706D463}" srcOrd="0" destOrd="0" presId="urn:microsoft.com/office/officeart/2005/8/layout/cycle6"/>
     <dgm:cxn modelId="{056A086C-D65C-8545-A4E2-6DAD7A176C07}" srcId="{F2AA9E6C-32D4-E143-B4C1-8323F5885693}" destId="{69112F31-8EA7-934A-94C2-F9C45529A03A}" srcOrd="1" destOrd="0" parTransId="{8FA3605F-C7D0-2A41-A9FE-12F91A45D350}" sibTransId="{34B8F909-BE72-3641-B716-D95BA06B7D24}"/>
-    <dgm:cxn modelId="{44451C92-98C4-4246-97AE-BADFD30C1803}" type="presOf" srcId="{8F6A9027-1016-0E48-8D2C-387C4E6425C1}" destId="{52E2D454-DEB3-0045-8C98-100D8D0B390A}" srcOrd="0" destOrd="0" presId="urn:microsoft.com/office/officeart/2005/8/layout/cycle6"/>
-    <dgm:cxn modelId="{375428FB-61B8-3E4F-AF6C-90B1A16E075D}" type="presOf" srcId="{1B32649E-9152-F740-ABAE-F8D218EB563C}" destId="{348744F8-58A7-1947-8982-1C5A6326D2D3}" srcOrd="0" destOrd="0" presId="urn:microsoft.com/office/officeart/2005/8/layout/cycle6"/>
+    <dgm:cxn modelId="{84DD6098-914F-3640-8F07-79AF5C97FFA1}" type="presOf" srcId="{21D29210-83AD-4144-90F7-E799EA922D66}" destId="{33B66A95-5460-5149-96FC-9F90C0DE0FB7}" srcOrd="0" destOrd="0" presId="urn:microsoft.com/office/officeart/2005/8/layout/cycle6"/>
+    <dgm:cxn modelId="{08BC1C92-A07E-824A-8F16-5DCDB7D35E19}" type="presOf" srcId="{CFD1D5B7-A236-4148-A257-4F15376180F1}" destId="{60876D31-8141-E546-B35B-C21A6BE94BFE}" srcOrd="0" destOrd="0" presId="urn:microsoft.com/office/officeart/2005/8/layout/cycle6"/>
+    <dgm:cxn modelId="{FF646128-7C1A-B741-B224-FA3107D25185}" type="presOf" srcId="{00C2C499-F023-9C4B-ABEE-1A521DB4A7DD}" destId="{1F11EC56-0728-F04D-A48B-B5D87E7476EF}" srcOrd="0" destOrd="0" presId="urn:microsoft.com/office/officeart/2005/8/layout/cycle6"/>
     <dgm:cxn modelId="{90371554-F177-7B48-862A-D03AA6F02119}" type="presOf" srcId="{5DF77001-9AAE-C74E-8FCC-76A47D898C55}" destId="{505E05D5-587F-B94E-9FD4-9C57DFC470A2}" srcOrd="0" destOrd="0" presId="urn:microsoft.com/office/officeart/2005/8/layout/cycle6"/>
     <dgm:cxn modelId="{02D29D97-913C-874C-ADCC-C40189F50A67}" srcId="{F2AA9E6C-32D4-E143-B4C1-8323F5885693}" destId="{884FC63A-8684-A946-8A4D-9A97E9DECCD5}" srcOrd="3" destOrd="0" parTransId="{45FE1951-9F2C-C944-A894-AE569D975842}" sibTransId="{1B32649E-9152-F740-ABAE-F8D218EB563C}"/>
+    <dgm:cxn modelId="{E915C8B1-60E4-6445-A078-D967E313A794}" type="presOf" srcId="{F2AA9E6C-32D4-E143-B4C1-8323F5885693}" destId="{698B8BAB-0490-4D42-8916-57106E38A5E6}" srcOrd="0" destOrd="0" presId="urn:microsoft.com/office/officeart/2005/8/layout/cycle6"/>
+    <dgm:cxn modelId="{F8CA60E5-7720-0343-8D64-5641EBAFD148}" type="presOf" srcId="{884FC63A-8684-A946-8A4D-9A97E9DECCD5}" destId="{2795BB30-447C-9B46-9F86-B12019B65932}" srcOrd="0" destOrd="0" presId="urn:microsoft.com/office/officeart/2005/8/layout/cycle6"/>
+    <dgm:cxn modelId="{375428FB-61B8-3E4F-AF6C-90B1A16E075D}" type="presOf" srcId="{1B32649E-9152-F740-ABAE-F8D218EB563C}" destId="{348744F8-58A7-1947-8982-1C5A6326D2D3}" srcOrd="0" destOrd="0" presId="urn:microsoft.com/office/officeart/2005/8/layout/cycle6"/>
+    <dgm:cxn modelId="{5BA835BF-70E1-2A48-9128-148874E04563}" type="presOf" srcId="{F9B230ED-6196-744A-9501-511F0AF26565}" destId="{22C0D86C-105D-8F40-8CF5-ABBDD706D463}" srcOrd="0" destOrd="0" presId="urn:microsoft.com/office/officeart/2005/8/layout/cycle6"/>
     <dgm:cxn modelId="{9F4CE09B-E031-3248-9DD0-8D31F2C4F098}" srcId="{F2AA9E6C-32D4-E143-B4C1-8323F5885693}" destId="{3E4B078D-2B88-F24A-983B-7E3B1DA39EA8}" srcOrd="0" destOrd="0" parTransId="{A9130C4F-D749-AF41-917F-1D446BF19ACD}" sibTransId="{F9B230ED-6196-744A-9501-511F0AF26565}"/>
+    <dgm:cxn modelId="{901C4254-49CF-5C41-A3D3-41DBAEF09077}" srcId="{F2AA9E6C-32D4-E143-B4C1-8323F5885693}" destId="{21D29210-83AD-4144-90F7-E799EA922D66}" srcOrd="5" destOrd="0" parTransId="{7EB2BD94-4CD1-3049-9702-ACA060C2840E}" sibTransId="{00C2C499-F023-9C4B-ABEE-1A521DB4A7DD}"/>
+    <dgm:cxn modelId="{379BB9B3-7645-7D47-9759-6DB624EA39E8}" type="presOf" srcId="{3E4B078D-2B88-F24A-983B-7E3B1DA39EA8}" destId="{3D9EF82D-0041-DC49-8628-3E721199BA89}" srcOrd="0" destOrd="0" presId="urn:microsoft.com/office/officeart/2005/8/layout/cycle6"/>
+    <dgm:cxn modelId="{D8C89E1E-B693-CF46-B777-659EA7D008D5}" srcId="{F2AA9E6C-32D4-E143-B4C1-8323F5885693}" destId="{1C9AF31C-6701-294A-8523-64A8E647FBC5}" srcOrd="4" destOrd="0" parTransId="{6F6B9BF6-FAB3-F64A-B99C-E2674A2FB6F3}" sibTransId="{5DF77001-9AAE-C74E-8FCC-76A47D898C55}"/>
+    <dgm:cxn modelId="{44451C92-98C4-4246-97AE-BADFD30C1803}" type="presOf" srcId="{8F6A9027-1016-0E48-8D2C-387C4E6425C1}" destId="{52E2D454-DEB3-0045-8C98-100D8D0B390A}" srcOrd="0" destOrd="0" presId="urn:microsoft.com/office/officeart/2005/8/layout/cycle6"/>
+    <dgm:cxn modelId="{E0DC473E-12E2-8640-82E5-D779140A50FC}" type="presOf" srcId="{34B8F909-BE72-3641-B716-D95BA06B7D24}" destId="{5F76135B-3823-414A-B176-155A5F4EA279}" srcOrd="0" destOrd="0" presId="urn:microsoft.com/office/officeart/2005/8/layout/cycle6"/>
+    <dgm:cxn modelId="{9598BADE-3C95-B042-A6AE-D841CCC53126}" srcId="{F2AA9E6C-32D4-E143-B4C1-8323F5885693}" destId="{CFD1D5B7-A236-4148-A257-4F15376180F1}" srcOrd="2" destOrd="0" parTransId="{583F1E4E-A41E-244D-8F1A-CD23F3DA4963}" sibTransId="{8F6A9027-1016-0E48-8D2C-387C4E6425C1}"/>
     <dgm:cxn modelId="{391512D4-EB38-2544-9A02-D402F1E11D0C}" type="presParOf" srcId="{698B8BAB-0490-4D42-8916-57106E38A5E6}" destId="{3D9EF82D-0041-DC49-8628-3E721199BA89}" srcOrd="0" destOrd="0" presId="urn:microsoft.com/office/officeart/2005/8/layout/cycle6"/>
     <dgm:cxn modelId="{CA2C7460-387A-BE41-ABCF-0459ECB7268D}" type="presParOf" srcId="{698B8BAB-0490-4D42-8916-57106E38A5E6}" destId="{DA52E55E-0807-4244-A0A5-E7EE3E4D8468}" srcOrd="1" destOrd="0" presId="urn:microsoft.com/office/officeart/2005/8/layout/cycle6"/>
     <dgm:cxn modelId="{3A1FB1DE-0ACD-2642-9A38-1FC9AA918A70}" type="presParOf" srcId="{698B8BAB-0490-4D42-8916-57106E38A5E6}" destId="{22C0D86C-105D-8F40-8CF5-ABBDD706D463}" srcOrd="2" destOrd="0" presId="urn:microsoft.com/office/officeart/2005/8/layout/cycle6"/>
@@ -14499,7 +14499,7 @@
           <a:p>
             <a:fld id="{418674B6-3DD0-DD4C-87E2-C82AEC08B29F}" type="datetimeFigureOut">
               <a:rPr lang="en-US" smtClean="0"/>
-              <a:t>10/31/16</a:t>
+              <a:t>11/1/16</a:t>
             </a:fld>
             <a:endParaRPr lang="en-US"/>
           </a:p>
@@ -14767,6 +14767,90 @@
 </p:notesMaster>
 </file>
 
+<file path=ppt/notesSlides/notesSlide1.xml><?xml version="1.0" encoding="utf-8"?>
+<p:notes xmlns:a="http://schemas.openxmlformats.org/drawingml/2006/main" xmlns:r="http://schemas.openxmlformats.org/officeDocument/2006/relationships" xmlns:p="http://schemas.openxmlformats.org/presentationml/2006/main">
+  <p:cSld>
+    <p:spTree>
+      <p:nvGrpSpPr>
+        <p:cNvPr id="1" name=""/>
+        <p:cNvGrpSpPr/>
+        <p:nvPr/>
+      </p:nvGrpSpPr>
+      <p:grpSpPr>
+        <a:xfrm>
+          <a:off x="0" y="0"/>
+          <a:ext cx="0" cy="0"/>
+          <a:chOff x="0" y="0"/>
+          <a:chExt cx="0" cy="0"/>
+        </a:xfrm>
+      </p:grpSpPr>
+      <p:sp>
+        <p:nvSpPr>
+          <p:cNvPr id="2" name="Slide Image Placeholder 1"/>
+          <p:cNvSpPr>
+            <a:spLocks noGrp="1" noRot="1" noChangeAspect="1"/>
+          </p:cNvSpPr>
+          <p:nvPr>
+            <p:ph type="sldImg"/>
+          </p:nvPr>
+        </p:nvSpPr>
+        <p:spPr/>
+      </p:sp>
+      <p:sp>
+        <p:nvSpPr>
+          <p:cNvPr id="3" name="Notes Placeholder 2"/>
+          <p:cNvSpPr>
+            <a:spLocks noGrp="1"/>
+          </p:cNvSpPr>
+          <p:nvPr>
+            <p:ph type="body" idx="1"/>
+          </p:nvPr>
+        </p:nvSpPr>
+        <p:spPr/>
+        <p:txBody>
+          <a:bodyPr/>
+          <a:lstStyle/>
+          <a:p>
+            <a:endParaRPr lang="en-US" dirty="0"/>
+          </a:p>
+        </p:txBody>
+      </p:sp>
+      <p:sp>
+        <p:nvSpPr>
+          <p:cNvPr id="4" name="Slide Number Placeholder 3"/>
+          <p:cNvSpPr>
+            <a:spLocks noGrp="1"/>
+          </p:cNvSpPr>
+          <p:nvPr>
+            <p:ph type="sldNum" sz="quarter" idx="10"/>
+          </p:nvPr>
+        </p:nvSpPr>
+        <p:spPr/>
+        <p:txBody>
+          <a:bodyPr/>
+          <a:lstStyle/>
+          <a:p>
+            <a:fld id="{EC67A1BE-BAC5-3E4D-BFDD-87773E79784F}" type="slidenum">
+              <a:rPr lang="en-US" smtClean="0"/>
+              <a:t>4</a:t>
+            </a:fld>
+            <a:endParaRPr lang="en-US"/>
+          </a:p>
+        </p:txBody>
+      </p:sp>
+    </p:spTree>
+    <p:extLst>
+      <p:ext uri="{BB962C8B-B14F-4D97-AF65-F5344CB8AC3E}">
+        <p14:creationId xmlns:p14="http://schemas.microsoft.com/office/powerpoint/2010/main" val="1221861289"/>
+      </p:ext>
+    </p:extLst>
+  </p:cSld>
+  <p:clrMapOvr>
+    <a:masterClrMapping/>
+  </p:clrMapOvr>
+</p:notes>
+</file>
+
 <file path=ppt/slideLayouts/slideLayout1.xml><?xml version="1.0" encoding="utf-8"?>
 <p:sldLayout xmlns:a="http://schemas.openxmlformats.org/drawingml/2006/main" xmlns:r="http://schemas.openxmlformats.org/officeDocument/2006/relationships" xmlns:p="http://schemas.openxmlformats.org/presentationml/2006/main" type="title" preserve="1">
   <p:cSld name="Title Slide">
@@ -14898,7 +14982,7 @@
           <a:p>
             <a:fld id="{5192CB05-E4E3-6543-BB47-54865E41FD91}" type="datetimeFigureOut">
               <a:rPr lang="en-US" smtClean="0"/>
-              <a:t>10/31/16</a:t>
+              <a:t>11/1/16</a:t>
             </a:fld>
             <a:endParaRPr lang="en-US"/>
           </a:p>
@@ -15068,7 +15152,7 @@
           <a:p>
             <a:fld id="{5192CB05-E4E3-6543-BB47-54865E41FD91}" type="datetimeFigureOut">
               <a:rPr lang="en-US" smtClean="0"/>
-              <a:t>10/31/16</a:t>
+              <a:t>11/1/16</a:t>
             </a:fld>
             <a:endParaRPr lang="en-US"/>
           </a:p>
@@ -15248,7 +15332,7 @@
           <a:p>
             <a:fld id="{5192CB05-E4E3-6543-BB47-54865E41FD91}" type="datetimeFigureOut">
               <a:rPr lang="en-US" smtClean="0"/>
-              <a:t>10/31/16</a:t>
+              <a:t>11/1/16</a:t>
             </a:fld>
             <a:endParaRPr lang="en-US"/>
           </a:p>
@@ -15418,7 +15502,7 @@
           <a:p>
             <a:fld id="{5192CB05-E4E3-6543-BB47-54865E41FD91}" type="datetimeFigureOut">
               <a:rPr lang="en-US" smtClean="0"/>
-              <a:t>10/31/16</a:t>
+              <a:t>11/1/16</a:t>
             </a:fld>
             <a:endParaRPr lang="en-US"/>
           </a:p>
@@ -15662,7 +15746,7 @@
           <a:p>
             <a:fld id="{5192CB05-E4E3-6543-BB47-54865E41FD91}" type="datetimeFigureOut">
               <a:rPr lang="en-US" smtClean="0"/>
-              <a:t>10/31/16</a:t>
+              <a:t>11/1/16</a:t>
             </a:fld>
             <a:endParaRPr lang="en-US"/>
           </a:p>
@@ -15894,7 +15978,7 @@
           <a:p>
             <a:fld id="{5192CB05-E4E3-6543-BB47-54865E41FD91}" type="datetimeFigureOut">
               <a:rPr lang="en-US" smtClean="0"/>
-              <a:t>10/31/16</a:t>
+              <a:t>11/1/16</a:t>
             </a:fld>
             <a:endParaRPr lang="en-US"/>
           </a:p>
@@ -16261,7 +16345,7 @@
           <a:p>
             <a:fld id="{5192CB05-E4E3-6543-BB47-54865E41FD91}" type="datetimeFigureOut">
               <a:rPr lang="en-US" smtClean="0"/>
-              <a:t>10/31/16</a:t>
+              <a:t>11/1/16</a:t>
             </a:fld>
             <a:endParaRPr lang="en-US"/>
           </a:p>
@@ -16379,7 +16463,7 @@
           <a:p>
             <a:fld id="{5192CB05-E4E3-6543-BB47-54865E41FD91}" type="datetimeFigureOut">
               <a:rPr lang="en-US" smtClean="0"/>
-              <a:t>10/31/16</a:t>
+              <a:t>11/1/16</a:t>
             </a:fld>
             <a:endParaRPr lang="en-US"/>
           </a:p>
@@ -16474,7 +16558,7 @@
           <a:p>
             <a:fld id="{5192CB05-E4E3-6543-BB47-54865E41FD91}" type="datetimeFigureOut">
               <a:rPr lang="en-US" smtClean="0"/>
-              <a:t>10/31/16</a:t>
+              <a:t>11/1/16</a:t>
             </a:fld>
             <a:endParaRPr lang="en-US"/>
           </a:p>
@@ -16751,7 +16835,7 @@
           <a:p>
             <a:fld id="{5192CB05-E4E3-6543-BB47-54865E41FD91}" type="datetimeFigureOut">
               <a:rPr lang="en-US" smtClean="0"/>
-              <a:t>10/31/16</a:t>
+              <a:t>11/1/16</a:t>
             </a:fld>
             <a:endParaRPr lang="en-US"/>
           </a:p>
@@ -17008,7 +17092,7 @@
           <a:p>
             <a:fld id="{5192CB05-E4E3-6543-BB47-54865E41FD91}" type="datetimeFigureOut">
               <a:rPr lang="en-US" smtClean="0"/>
-              <a:t>10/31/16</a:t>
+              <a:t>11/1/16</a:t>
             </a:fld>
             <a:endParaRPr lang="en-US"/>
           </a:p>
@@ -17221,7 +17305,7 @@
           <a:p>
             <a:fld id="{5192CB05-E4E3-6543-BB47-54865E41FD91}" type="datetimeFigureOut">
               <a:rPr lang="en-US" smtClean="0"/>
-              <a:t>10/31/16</a:t>
+              <a:t>11/1/16</a:t>
             </a:fld>
             <a:endParaRPr lang="en-US"/>
           </a:p>
@@ -17894,7 +17978,122 @@
         </p:nvSpPr>
         <p:spPr>
           <a:xfrm>
-            <a:off x="6433850" y="3393625"/>
+            <a:off x="5522345" y="3781948"/>
+            <a:ext cx="1483793" cy="574662"/>
+          </a:xfrm>
+          <a:prstGeom prst="can">
+            <a:avLst/>
+          </a:prstGeom>
+          <a:gradFill flip="none" rotWithShape="1">
+            <a:gsLst>
+              <a:gs pos="0">
+                <a:schemeClr val="accent1">
+                  <a:lumMod val="67000"/>
+                </a:schemeClr>
+              </a:gs>
+              <a:gs pos="48000">
+                <a:schemeClr val="accent1">
+                  <a:lumMod val="97000"/>
+                  <a:lumOff val="3000"/>
+                </a:schemeClr>
+              </a:gs>
+              <a:gs pos="100000">
+                <a:schemeClr val="accent1">
+                  <a:lumMod val="60000"/>
+                  <a:lumOff val="40000"/>
+                </a:schemeClr>
+              </a:gs>
+            </a:gsLst>
+            <a:lin ang="16200000" scaled="1"/>
+            <a:tileRect/>
+          </a:gradFill>
+          <a:ln>
+            <a:solidFill>
+              <a:schemeClr val="accent1"/>
+            </a:solidFill>
+          </a:ln>
+          <a:effectLst>
+            <a:outerShdw blurRad="50800" dist="38100" dir="2700000" algn="tl" rotWithShape="0">
+              <a:prstClr val="black">
+                <a:alpha val="40000"/>
+              </a:prstClr>
+            </a:outerShdw>
+          </a:effectLst>
+        </p:spPr>
+        <p:style>
+          <a:lnRef idx="2">
+            <a:schemeClr val="accent1">
+              <a:shade val="50000"/>
+            </a:schemeClr>
+          </a:lnRef>
+          <a:fillRef idx="1">
+            <a:schemeClr val="accent1"/>
+          </a:fillRef>
+          <a:effectRef idx="0">
+            <a:schemeClr val="accent1"/>
+          </a:effectRef>
+          <a:fontRef idx="minor">
+            <a:schemeClr val="lt1"/>
+          </a:fontRef>
+        </p:style>
+        <p:txBody>
+          <a:bodyPr rtlCol="0" anchor="ctr"/>
+          <a:lstStyle/>
+          <a:p>
+            <a:pPr algn="ctr"/>
+            <a:r>
+              <a:rPr lang="en-US" b="1">
+                <a:solidFill>
+                  <a:schemeClr val="tx1"/>
+                </a:solidFill>
+                <a:latin typeface="Helvetica" charset="0"/>
+                <a:ea typeface="Helvetica" charset="0"/>
+                <a:cs typeface="Helvetica" charset="0"/>
+              </a:rPr>
+              <a:t>r</a:t>
+            </a:r>
+            <a:r>
+              <a:rPr lang="en-US" b="1" smtClean="0">
+                <a:solidFill>
+                  <a:schemeClr val="tx1"/>
+                </a:solidFill>
+                <a:latin typeface="Helvetica" charset="0"/>
+                <a:ea typeface="Helvetica" charset="0"/>
+                <a:cs typeface="Helvetica" charset="0"/>
+              </a:rPr>
+              <a:t>esult </a:t>
+            </a:r>
+            <a:r>
+              <a:rPr lang="en-US" b="1" smtClean="0">
+                <a:solidFill>
+                  <a:schemeClr val="tx1"/>
+                </a:solidFill>
+                <a:latin typeface="Helvetica" charset="0"/>
+                <a:ea typeface="Helvetica" charset="0"/>
+                <a:cs typeface="Helvetica" charset="0"/>
+              </a:rPr>
+              <a:t>data</a:t>
+            </a:r>
+            <a:endParaRPr lang="en-US" b="1" dirty="0">
+              <a:solidFill>
+                <a:schemeClr val="tx1"/>
+              </a:solidFill>
+              <a:latin typeface="Helvetica" charset="0"/>
+              <a:ea typeface="Helvetica" charset="0"/>
+              <a:cs typeface="Helvetica" charset="0"/>
+            </a:endParaRPr>
+          </a:p>
+        </p:txBody>
+      </p:sp>
+      <p:sp>
+        <p:nvSpPr>
+          <p:cNvPr id="4" name="Can 3"/>
+          <p:cNvSpPr/>
+          <p:nvPr/>
+        </p:nvSpPr>
+        <p:spPr>
+          <a:xfrm>
+            <a:off x="1565937" y="1708527"/>
             <a:ext cx="1189822" cy="837282"/>
           </a:xfrm>
           <a:prstGeom prst="can">
@@ -17923,6 +18122,18 @@
             <a:lin ang="16200000" scaled="1"/>
             <a:tileRect/>
           </a:gradFill>
+          <a:ln>
+            <a:solidFill>
+              <a:schemeClr val="accent1"/>
+            </a:solidFill>
+          </a:ln>
+          <a:effectLst>
+            <a:outerShdw blurRad="50800" dist="38100" dir="2700000" algn="tl" rotWithShape="0">
+              <a:prstClr val="black">
+                <a:alpha val="40000"/>
+              </a:prstClr>
+            </a:outerShdw>
+          </a:effectLst>
         </p:spPr>
         <p:style>
           <a:lnRef idx="2">
@@ -17946,49 +18157,36 @@
           <a:p>
             <a:pPr algn="ctr"/>
             <a:r>
-              <a:rPr lang="en-US" sz="2400" dirty="0">
+              <a:rPr lang="en-US" b="1" dirty="0" err="1" smtClean="0">
                 <a:solidFill>
                   <a:schemeClr val="tx1"/>
                 </a:solidFill>
+                <a:latin typeface="Helvetica" charset="0"/>
+                <a:ea typeface="Helvetica" charset="0"/>
+                <a:cs typeface="Helvetica" charset="0"/>
               </a:rPr>
-              <a:t>r</a:t>
+              <a:t>github</a:t>
             </a:r>
-            <a:r>
-              <a:rPr lang="en-US" sz="2400" dirty="0" smtClean="0">
-                <a:solidFill>
-                  <a:schemeClr val="tx1"/>
-                </a:solidFill>
-              </a:rPr>
-              <a:t>esult </a:t>
-            </a:r>
-          </a:p>
-          <a:p>
-            <a:pPr algn="ctr"/>
-            <a:r>
-              <a:rPr lang="en-US" sz="2400" dirty="0" smtClean="0">
-                <a:solidFill>
-                  <a:schemeClr val="tx1"/>
-                </a:solidFill>
-              </a:rPr>
-              <a:t>data</a:t>
-            </a:r>
-            <a:endParaRPr lang="en-US" sz="2400" dirty="0">
+            <a:endParaRPr lang="en-US" b="1" dirty="0">
               <a:solidFill>
                 <a:schemeClr val="tx1"/>
               </a:solidFill>
+              <a:latin typeface="Helvetica" charset="0"/>
+              <a:ea typeface="Helvetica" charset="0"/>
+              <a:cs typeface="Helvetica" charset="0"/>
             </a:endParaRPr>
           </a:p>
         </p:txBody>
       </p:sp>
       <p:sp>
         <p:nvSpPr>
-          <p:cNvPr id="4" name="Can 3"/>
+          <p:cNvPr id="5" name="Can 4"/>
           <p:cNvSpPr/>
           <p:nvPr/>
         </p:nvSpPr>
         <p:spPr>
           <a:xfrm>
-            <a:off x="3712683" y="1153097"/>
+            <a:off x="1640993" y="2784227"/>
             <a:ext cx="1189822" cy="837282"/>
           </a:xfrm>
           <a:prstGeom prst="can">
@@ -18017,6 +18215,18 @@
             <a:lin ang="16200000" scaled="1"/>
             <a:tileRect/>
           </a:gradFill>
+          <a:ln>
+            <a:solidFill>
+              <a:schemeClr val="accent1"/>
+            </a:solidFill>
+          </a:ln>
+          <a:effectLst>
+            <a:outerShdw blurRad="50800" dist="38100" dir="2700000" algn="tl" rotWithShape="0">
+              <a:prstClr val="black">
+                <a:alpha val="40000"/>
+              </a:prstClr>
+            </a:outerShdw>
+          </a:effectLst>
         </p:spPr>
         <p:style>
           <a:lnRef idx="2">
@@ -18040,30 +18250,69 @@
           <a:p>
             <a:pPr algn="ctr"/>
             <a:r>
-              <a:rPr lang="en-US" sz="2400" dirty="0" err="1" smtClean="0">
+              <a:rPr lang="en-US" b="1" dirty="0" err="1">
                 <a:solidFill>
                   <a:schemeClr val="tx1"/>
                 </a:solidFill>
+                <a:latin typeface="Helvetica" charset="0"/>
+                <a:ea typeface="Helvetica" charset="0"/>
+                <a:cs typeface="Helvetica" charset="0"/>
               </a:rPr>
-              <a:t>github</a:t>
+              <a:t>a</a:t>
             </a:r>
-            <a:endParaRPr lang="en-US" sz="2400" dirty="0">
+            <a:r>
+              <a:rPr lang="en-US" b="1" dirty="0" err="1" smtClean="0">
+                <a:solidFill>
+                  <a:schemeClr val="tx1"/>
+                </a:solidFill>
+                <a:latin typeface="Helvetica" charset="0"/>
+                <a:ea typeface="Helvetica" charset="0"/>
+                <a:cs typeface="Helvetica" charset="0"/>
+              </a:rPr>
+              <a:t>nsible</a:t>
+            </a:r>
+            <a:endParaRPr lang="en-US" b="1" dirty="0" smtClean="0">
               <a:solidFill>
                 <a:schemeClr val="tx1"/>
               </a:solidFill>
+              <a:latin typeface="Helvetica" charset="0"/>
+              <a:ea typeface="Helvetica" charset="0"/>
+              <a:cs typeface="Helvetica" charset="0"/>
+            </a:endParaRPr>
+          </a:p>
+          <a:p>
+            <a:pPr algn="ctr"/>
+            <a:r>
+              <a:rPr lang="en-US" b="1" dirty="0" smtClean="0">
+                <a:solidFill>
+                  <a:schemeClr val="tx1"/>
+                </a:solidFill>
+                <a:latin typeface="Helvetica" charset="0"/>
+                <a:ea typeface="Helvetica" charset="0"/>
+                <a:cs typeface="Helvetica" charset="0"/>
+              </a:rPr>
+              <a:t>galaxy</a:t>
+            </a:r>
+            <a:endParaRPr lang="en-US" b="1" dirty="0">
+              <a:solidFill>
+                <a:schemeClr val="tx1"/>
+              </a:solidFill>
+              <a:latin typeface="Helvetica" charset="0"/>
+              <a:ea typeface="Helvetica" charset="0"/>
+              <a:cs typeface="Helvetica" charset="0"/>
             </a:endParaRPr>
           </a:p>
         </p:txBody>
       </p:sp>
       <p:sp>
         <p:nvSpPr>
-          <p:cNvPr id="5" name="Can 4"/>
+          <p:cNvPr id="6" name="Can 5"/>
           <p:cNvSpPr/>
           <p:nvPr/>
         </p:nvSpPr>
         <p:spPr>
           <a:xfrm>
-            <a:off x="3037298" y="3057026"/>
+            <a:off x="1640993" y="3859927"/>
             <a:ext cx="1189822" cy="837282"/>
           </a:xfrm>
           <a:prstGeom prst="can">
@@ -18092,6 +18341,18 @@
             <a:lin ang="16200000" scaled="1"/>
             <a:tileRect/>
           </a:gradFill>
+          <a:ln>
+            <a:solidFill>
+              <a:schemeClr val="accent1"/>
+            </a:solidFill>
+          </a:ln>
+          <a:effectLst>
+            <a:outerShdw blurRad="50800" dist="38100" dir="2700000" algn="tl" rotWithShape="0">
+              <a:prstClr val="black">
+                <a:alpha val="40000"/>
+              </a:prstClr>
+            </a:outerShdw>
+          </a:effectLst>
         </p:spPr>
         <p:style>
           <a:lnRef idx="2">
@@ -18115,116 +18376,23 @@
           <a:p>
             <a:pPr algn="ctr"/>
             <a:r>
-              <a:rPr lang="en-US" sz="2400" dirty="0" err="1">
+              <a:rPr lang="en-US" b="1" dirty="0" smtClean="0">
                 <a:solidFill>
                   <a:schemeClr val="tx1"/>
                 </a:solidFill>
+                <a:latin typeface="Helvetica" charset="0"/>
+                <a:ea typeface="Helvetica" charset="0"/>
+                <a:cs typeface="Helvetica" charset="0"/>
               </a:rPr>
-              <a:t>a</a:t>
+              <a:t>data</a:t>
             </a:r>
-            <a:r>
-              <a:rPr lang="en-US" sz="2400" dirty="0" err="1" smtClean="0">
-                <a:solidFill>
-                  <a:schemeClr val="tx1"/>
-                </a:solidFill>
-              </a:rPr>
-              <a:t>nsible</a:t>
-            </a:r>
-            <a:endParaRPr lang="en-US" sz="2400" dirty="0" smtClean="0">
+            <a:endParaRPr lang="en-US" b="1" dirty="0">
               <a:solidFill>
                 <a:schemeClr val="tx1"/>
               </a:solidFill>
-            </a:endParaRPr>
-          </a:p>
-          <a:p>
-            <a:pPr algn="ctr"/>
-            <a:r>
-              <a:rPr lang="en-US" sz="2400" dirty="0" smtClean="0">
-                <a:solidFill>
-                  <a:schemeClr val="tx1"/>
-                </a:solidFill>
-              </a:rPr>
-              <a:t>galaxy</a:t>
-            </a:r>
-            <a:endParaRPr lang="en-US" sz="2400" dirty="0">
-              <a:solidFill>
-                <a:schemeClr val="tx1"/>
-              </a:solidFill>
-            </a:endParaRPr>
-          </a:p>
-        </p:txBody>
-      </p:sp>
-      <p:sp>
-        <p:nvSpPr>
-          <p:cNvPr id="6" name="Can 5"/>
-          <p:cNvSpPr/>
-          <p:nvPr/>
-        </p:nvSpPr>
-        <p:spPr>
-          <a:xfrm>
-            <a:off x="3066043" y="4330733"/>
-            <a:ext cx="1189822" cy="837282"/>
-          </a:xfrm>
-          <a:prstGeom prst="can">
-            <a:avLst/>
-          </a:prstGeom>
-          <a:gradFill flip="none" rotWithShape="1">
-            <a:gsLst>
-              <a:gs pos="0">
-                <a:schemeClr val="accent1">
-                  <a:lumMod val="67000"/>
-                </a:schemeClr>
-              </a:gs>
-              <a:gs pos="48000">
-                <a:schemeClr val="accent1">
-                  <a:lumMod val="97000"/>
-                  <a:lumOff val="3000"/>
-                </a:schemeClr>
-              </a:gs>
-              <a:gs pos="100000">
-                <a:schemeClr val="accent1">
-                  <a:lumMod val="60000"/>
-                  <a:lumOff val="40000"/>
-                </a:schemeClr>
-              </a:gs>
-            </a:gsLst>
-            <a:lin ang="16200000" scaled="1"/>
-            <a:tileRect/>
-          </a:gradFill>
-        </p:spPr>
-        <p:style>
-          <a:lnRef idx="2">
-            <a:schemeClr val="accent1">
-              <a:shade val="50000"/>
-            </a:schemeClr>
-          </a:lnRef>
-          <a:fillRef idx="1">
-            <a:schemeClr val="accent1"/>
-          </a:fillRef>
-          <a:effectRef idx="0">
-            <a:schemeClr val="accent1"/>
-          </a:effectRef>
-          <a:fontRef idx="minor">
-            <a:schemeClr val="lt1"/>
-          </a:fontRef>
-        </p:style>
-        <p:txBody>
-          <a:bodyPr rtlCol="0" anchor="ctr"/>
-          <a:lstStyle/>
-          <a:p>
-            <a:pPr algn="ctr"/>
-            <a:r>
-              <a:rPr lang="en-US" sz="2400" dirty="0" smtClean="0">
-                <a:solidFill>
-                  <a:schemeClr val="tx1"/>
-                </a:solidFill>
-              </a:rPr>
-              <a:t>data</a:t>
-            </a:r>
-            <a:endParaRPr lang="en-US" sz="2400" dirty="0">
-              <a:solidFill>
-                <a:schemeClr val="tx1"/>
-              </a:solidFill>
+              <a:latin typeface="Helvetica" charset="0"/>
+              <a:ea typeface="Helvetica" charset="0"/>
+              <a:cs typeface="Helvetica" charset="0"/>
             </a:endParaRPr>
           </a:p>
         </p:txBody>
@@ -18237,8 +18405,8 @@
         </p:nvSpPr>
         <p:spPr>
           <a:xfrm>
-            <a:off x="5640777" y="2038079"/>
-            <a:ext cx="1079511" cy="1002535"/>
+            <a:off x="3962211" y="1706956"/>
+            <a:ext cx="1660608" cy="713035"/>
           </a:xfrm>
           <a:prstGeom prst="snipRoundRect">
             <a:avLst/>
@@ -18266,6 +18434,18 @@
             <a:lin ang="16200000" scaled="1"/>
             <a:tileRect/>
           </a:gradFill>
+          <a:ln>
+            <a:solidFill>
+              <a:schemeClr val="accent1"/>
+            </a:solidFill>
+          </a:ln>
+          <a:effectLst>
+            <a:outerShdw blurRad="50800" dist="38100" dir="2700000" algn="tl" rotWithShape="0">
+              <a:prstClr val="black">
+                <a:alpha val="40000"/>
+              </a:prstClr>
+            </a:outerShdw>
+          </a:effectLst>
         </p:spPr>
         <p:style>
           <a:lnRef idx="2">
@@ -18289,17 +18469,23 @@
           <a:p>
             <a:pPr algn="ctr"/>
             <a:r>
-              <a:rPr lang="en-US" sz="2400" dirty="0" smtClean="0">
+              <a:rPr lang="en-US" b="1" dirty="0" smtClean="0">
                 <a:solidFill>
                   <a:schemeClr val="tx1"/>
                 </a:solidFill>
+                <a:latin typeface="Helvetica" charset="0"/>
+                <a:ea typeface="Helvetica" charset="0"/>
+                <a:cs typeface="Helvetica" charset="0"/>
               </a:rPr>
               <a:t>playbook</a:t>
             </a:r>
-            <a:endParaRPr lang="en-US" sz="2400" dirty="0">
+            <a:endParaRPr lang="en-US" b="1" dirty="0">
               <a:solidFill>
                 <a:schemeClr val="tx1"/>
               </a:solidFill>
+              <a:latin typeface="Helvetica" charset="0"/>
+              <a:ea typeface="Helvetica" charset="0"/>
+              <a:cs typeface="Helvetica" charset="0"/>
             </a:endParaRPr>
           </a:p>
         </p:txBody>
@@ -18312,8 +18498,8 @@
         </p:nvSpPr>
         <p:spPr>
           <a:xfrm>
-            <a:off x="5640777" y="3521696"/>
-            <a:ext cx="1079511" cy="1002535"/>
+            <a:off x="3962211" y="4377526"/>
+            <a:ext cx="1660608" cy="743778"/>
           </a:xfrm>
           <a:prstGeom prst="snipRoundRect">
             <a:avLst/>
@@ -18341,6 +18527,18 @@
             <a:lin ang="16200000" scaled="1"/>
             <a:tileRect/>
           </a:gradFill>
+          <a:ln>
+            <a:solidFill>
+              <a:schemeClr val="accent1"/>
+            </a:solidFill>
+          </a:ln>
+          <a:effectLst>
+            <a:outerShdw blurRad="50800" dist="38100" dir="2700000" algn="tl" rotWithShape="0">
+              <a:prstClr val="black">
+                <a:alpha val="40000"/>
+              </a:prstClr>
+            </a:outerShdw>
+          </a:effectLst>
         </p:spPr>
         <p:style>
           <a:lnRef idx="2">
@@ -18364,36 +18562,81 @@
           <a:p>
             <a:pPr algn="ctr"/>
             <a:r>
-              <a:rPr lang="en-US" sz="2400" dirty="0">
+              <a:rPr lang="en-US" b="1" dirty="0">
                 <a:solidFill>
                   <a:schemeClr val="tx1"/>
                 </a:solidFill>
+                <a:latin typeface="Helvetica" charset="0"/>
+                <a:ea typeface="Helvetica" charset="0"/>
+                <a:cs typeface="Helvetica" charset="0"/>
               </a:rPr>
-              <a:t>r</a:t>
+              <a:t>v</a:t>
             </a:r>
             <a:r>
-              <a:rPr lang="en-US" sz="2400" dirty="0" smtClean="0">
+              <a:rPr lang="en-US" b="1" smtClean="0">
                 <a:solidFill>
                   <a:schemeClr val="tx1"/>
                 </a:solidFill>
+                <a:latin typeface="Helvetica" charset="0"/>
+                <a:ea typeface="Helvetica" charset="0"/>
+                <a:cs typeface="Helvetica" charset="0"/>
               </a:rPr>
-              <a:t>esult</a:t>
+              <a:t>erification</a:t>
+            </a:r>
+            <a:r>
+              <a:rPr lang="en-US" b="1" dirty="0" smtClean="0">
+                <a:solidFill>
+                  <a:schemeClr val="tx1"/>
+                </a:solidFill>
+                <a:latin typeface="Helvetica" charset="0"/>
+                <a:ea typeface="Helvetica" charset="0"/>
+                <a:cs typeface="Helvetica" charset="0"/>
+              </a:rPr>
+              <a:t>/</a:t>
             </a:r>
           </a:p>
           <a:p>
             <a:pPr algn="ctr"/>
             <a:r>
-              <a:rPr lang="en-US" sz="2400" dirty="0" smtClean="0">
+              <a:rPr lang="en-US" b="1" dirty="0" smtClean="0">
                 <a:solidFill>
                   <a:schemeClr val="tx1"/>
                 </a:solidFill>
+                <a:latin typeface="Helvetica" charset="0"/>
+                <a:ea typeface="Helvetica" charset="0"/>
+                <a:cs typeface="Helvetica" charset="0"/>
+              </a:rPr>
+              <a:t>Result</a:t>
+            </a:r>
+            <a:r>
+              <a:rPr lang="en-US" b="1" dirty="0" smtClean="0">
+                <a:solidFill>
+                  <a:schemeClr val="tx1"/>
+                </a:solidFill>
+                <a:latin typeface="Helvetica" charset="0"/>
+                <a:ea typeface="Helvetica" charset="0"/>
+                <a:cs typeface="Helvetica" charset="0"/>
+              </a:rPr>
+              <a:t> </a:t>
+            </a:r>
+            <a:r>
+              <a:rPr lang="en-US" b="1" dirty="0" smtClean="0">
+                <a:solidFill>
+                  <a:schemeClr val="tx1"/>
+                </a:solidFill>
+                <a:latin typeface="Helvetica" charset="0"/>
+                <a:ea typeface="Helvetica" charset="0"/>
+                <a:cs typeface="Helvetica" charset="0"/>
               </a:rPr>
               <a:t>tests</a:t>
             </a:r>
-            <a:endParaRPr lang="en-US" sz="2400" dirty="0">
+            <a:endParaRPr lang="en-US" b="1" dirty="0">
               <a:solidFill>
                 <a:schemeClr val="tx1"/>
               </a:solidFill>
+              <a:latin typeface="Helvetica" charset="0"/>
+              <a:ea typeface="Helvetica" charset="0"/>
+              <a:cs typeface="Helvetica" charset="0"/>
             </a:endParaRPr>
           </a:p>
         </p:txBody>
@@ -18406,8 +18649,8 @@
         </p:nvSpPr>
         <p:spPr>
           <a:xfrm>
-            <a:off x="5676396" y="444116"/>
-            <a:ext cx="1079511" cy="1002535"/>
+            <a:off x="3962211" y="571037"/>
+            <a:ext cx="1660608" cy="713035"/>
           </a:xfrm>
           <a:prstGeom prst="snipRoundRect">
             <a:avLst/>
@@ -18435,6 +18678,18 @@
             <a:lin ang="16200000" scaled="1"/>
             <a:tileRect/>
           </a:gradFill>
+          <a:ln>
+            <a:solidFill>
+              <a:schemeClr val="accent1"/>
+            </a:solidFill>
+          </a:ln>
+          <a:effectLst>
+            <a:outerShdw blurRad="50800" dist="38100" dir="2700000" algn="tl" rotWithShape="0">
+              <a:prstClr val="black">
+                <a:alpha val="40000"/>
+              </a:prstClr>
+            </a:outerShdw>
+          </a:effectLst>
         </p:spPr>
         <p:style>
           <a:lnRef idx="2">
@@ -18458,17 +18713,23 @@
           <a:p>
             <a:pPr algn="ctr"/>
             <a:r>
-              <a:rPr lang="en-US" sz="2400" smtClean="0">
+              <a:rPr lang="en-US" b="1" dirty="0" smtClean="0">
                 <a:solidFill>
                   <a:schemeClr val="tx1"/>
                 </a:solidFill>
+                <a:latin typeface="Helvetica" charset="0"/>
+                <a:ea typeface="Helvetica" charset="0"/>
+                <a:cs typeface="Helvetica" charset="0"/>
               </a:rPr>
               <a:t>Cloudmesh script</a:t>
             </a:r>
-            <a:endParaRPr lang="en-US" sz="2400" dirty="0">
+            <a:endParaRPr lang="en-US" b="1" dirty="0">
               <a:solidFill>
                 <a:schemeClr val="tx1"/>
               </a:solidFill>
+              <a:latin typeface="Helvetica" charset="0"/>
+              <a:ea typeface="Helvetica" charset="0"/>
+              <a:cs typeface="Helvetica" charset="0"/>
             </a:endParaRPr>
           </a:p>
         </p:txBody>
@@ -18476,22 +18737,22 @@
       <p:cxnSp>
         <p:nvCxnSpPr>
           <p:cNvPr id="13" name="Straight Arrow Connector 12"/>
-          <p:cNvCxnSpPr>
-            <a:stCxn id="4" idx="4"/>
-            <a:endCxn id="11" idx="2"/>
-          </p:cNvCxnSpPr>
+          <p:cNvCxnSpPr/>
           <p:nvPr/>
         </p:nvCxnSpPr>
         <p:spPr>
           <a:xfrm flipV="1">
-            <a:off x="4902505" y="945384"/>
-            <a:ext cx="773891" cy="626354"/>
+            <a:off x="2755759" y="881463"/>
+            <a:ext cx="1170066" cy="1260142"/>
           </a:xfrm>
           <a:prstGeom prst="straightConnector1">
             <a:avLst/>
           </a:prstGeom>
-          <a:ln>
-            <a:tailEnd type="triangle"/>
+          <a:ln w="76200">
+            <a:solidFill>
+              <a:schemeClr val="accent3"/>
+            </a:solidFill>
+            <a:tailEnd type="stealth"/>
           </a:ln>
         </p:spPr>
         <p:style>
@@ -18512,22 +18773,22 @@
       <p:cxnSp>
         <p:nvCxnSpPr>
           <p:cNvPr id="15" name="Straight Arrow Connector 14"/>
-          <p:cNvCxnSpPr>
-            <a:stCxn id="11" idx="2"/>
-            <a:endCxn id="5" idx="4"/>
-          </p:cNvCxnSpPr>
+          <p:cNvCxnSpPr/>
           <p:nvPr/>
         </p:nvCxnSpPr>
         <p:spPr>
           <a:xfrm flipH="1">
-            <a:off x="4227120" y="945384"/>
-            <a:ext cx="1449276" cy="2530283"/>
+            <a:off x="2830815" y="881463"/>
+            <a:ext cx="1095010" cy="2335842"/>
           </a:xfrm>
           <a:prstGeom prst="straightConnector1">
             <a:avLst/>
           </a:prstGeom>
-          <a:ln>
-            <a:tailEnd type="triangle"/>
+          <a:ln w="76200">
+            <a:solidFill>
+              <a:schemeClr val="accent3"/>
+            </a:solidFill>
+            <a:tailEnd type="stealth"/>
           </a:ln>
         </p:spPr>
         <p:style>
@@ -18548,22 +18809,22 @@
       <p:cxnSp>
         <p:nvCxnSpPr>
           <p:cNvPr id="18" name="Straight Arrow Connector 17"/>
-          <p:cNvCxnSpPr>
-            <a:stCxn id="5" idx="4"/>
-            <a:endCxn id="7" idx="2"/>
-          </p:cNvCxnSpPr>
+          <p:cNvCxnSpPr/>
           <p:nvPr/>
         </p:nvCxnSpPr>
         <p:spPr>
           <a:xfrm flipV="1">
-            <a:off x="4227120" y="2539347"/>
-            <a:ext cx="1413657" cy="936320"/>
+            <a:off x="2830815" y="2273511"/>
+            <a:ext cx="1089500" cy="943794"/>
           </a:xfrm>
           <a:prstGeom prst="straightConnector1">
             <a:avLst/>
           </a:prstGeom>
-          <a:ln>
-            <a:tailEnd type="triangle"/>
+          <a:ln w="76200">
+            <a:solidFill>
+              <a:schemeClr val="accent3"/>
+            </a:solidFill>
+            <a:tailEnd type="stealth"/>
           </a:ln>
         </p:spPr>
         <p:style>
@@ -18584,22 +18845,22 @@
       <p:cxnSp>
         <p:nvCxnSpPr>
           <p:cNvPr id="21" name="Straight Arrow Connector 20"/>
-          <p:cNvCxnSpPr>
-            <a:stCxn id="6" idx="4"/>
-            <a:endCxn id="7" idx="2"/>
-          </p:cNvCxnSpPr>
+          <p:cNvCxnSpPr/>
           <p:nvPr/>
         </p:nvCxnSpPr>
         <p:spPr>
           <a:xfrm flipV="1">
-            <a:off x="4255865" y="2539347"/>
-            <a:ext cx="1384912" cy="2210027"/>
+            <a:off x="2830815" y="2273511"/>
+            <a:ext cx="1089500" cy="2019494"/>
           </a:xfrm>
           <a:prstGeom prst="straightConnector1">
             <a:avLst/>
           </a:prstGeom>
-          <a:ln>
-            <a:tailEnd type="triangle"/>
+          <a:ln w="76200">
+            <a:solidFill>
+              <a:schemeClr val="accent3"/>
+            </a:solidFill>
+            <a:tailEnd type="stealth"/>
           </a:ln>
         </p:spPr>
         <p:style>
@@ -18622,20 +18883,23 @@
           <p:cNvPr id="23" name="Straight Arrow Connector 22"/>
           <p:cNvCxnSpPr>
             <a:stCxn id="7" idx="1"/>
-            <a:endCxn id="8" idx="3"/>
+            <a:endCxn id="94" idx="0"/>
           </p:cNvCxnSpPr>
           <p:nvPr/>
         </p:nvCxnSpPr>
         <p:spPr>
           <a:xfrm>
-            <a:off x="6180533" y="3040614"/>
-            <a:ext cx="0" cy="481082"/>
+            <a:off x="4792515" y="2419991"/>
+            <a:ext cx="0" cy="422884"/>
           </a:xfrm>
           <a:prstGeom prst="straightConnector1">
             <a:avLst/>
           </a:prstGeom>
-          <a:ln>
-            <a:tailEnd type="triangle"/>
+          <a:ln w="76200">
+            <a:solidFill>
+              <a:schemeClr val="accent3"/>
+            </a:solidFill>
+            <a:tailEnd type="stealth"/>
           </a:ln>
         </p:spPr>
         <p:style>
@@ -18661,8 +18925,8 @@
         </p:nvSpPr>
         <p:spPr>
           <a:xfrm>
-            <a:off x="5734278" y="4780553"/>
-            <a:ext cx="1068638" cy="905220"/>
+            <a:off x="4115677" y="5399920"/>
+            <a:ext cx="1269883" cy="905220"/>
           </a:xfrm>
           <a:prstGeom prst="diamond">
             <a:avLst/>
@@ -18690,6 +18954,18 @@
             <a:lin ang="16200000" scaled="1"/>
             <a:tileRect/>
           </a:gradFill>
+          <a:ln>
+            <a:solidFill>
+              <a:schemeClr val="accent1"/>
+            </a:solidFill>
+          </a:ln>
+          <a:effectLst>
+            <a:outerShdw blurRad="50800" dist="38100" dir="2700000" algn="tl" rotWithShape="0">
+              <a:prstClr val="black">
+                <a:alpha val="40000"/>
+              </a:prstClr>
+            </a:outerShdw>
+          </a:effectLst>
         </p:spPr>
         <p:style>
           <a:lnRef idx="2">
@@ -18713,17 +18989,23 @@
           <a:p>
             <a:pPr algn="ctr"/>
             <a:r>
-              <a:rPr lang="en-US" sz="2400" dirty="0" smtClean="0">
+              <a:rPr lang="en-US" b="1" dirty="0" smtClean="0">
                 <a:solidFill>
                   <a:schemeClr val="tx1"/>
                 </a:solidFill>
+                <a:latin typeface="Helvetica" charset="0"/>
+                <a:ea typeface="Helvetica" charset="0"/>
+                <a:cs typeface="Helvetica" charset="0"/>
               </a:rPr>
               <a:t>test</a:t>
             </a:r>
-            <a:endParaRPr lang="en-US" sz="2400" dirty="0">
+            <a:endParaRPr lang="en-US" b="1" dirty="0">
               <a:solidFill>
                 <a:schemeClr val="tx1"/>
               </a:solidFill>
+              <a:latin typeface="Helvetica" charset="0"/>
+              <a:ea typeface="Helvetica" charset="0"/>
+              <a:cs typeface="Helvetica" charset="0"/>
             </a:endParaRPr>
           </a:p>
         </p:txBody>
@@ -18731,22 +19013,22 @@
       <p:cxnSp>
         <p:nvCxnSpPr>
           <p:cNvPr id="27" name="Straight Arrow Connector 26"/>
-          <p:cNvCxnSpPr>
-            <a:stCxn id="40" idx="3"/>
-            <a:endCxn id="11" idx="2"/>
-          </p:cNvCxnSpPr>
+          <p:cNvCxnSpPr/>
           <p:nvPr/>
         </p:nvCxnSpPr>
         <p:spPr>
-          <a:xfrm>
-            <a:off x="3193382" y="924365"/>
-            <a:ext cx="2483014" cy="21019"/>
+          <a:xfrm flipV="1">
+            <a:off x="2833602" y="881463"/>
+            <a:ext cx="1092223" cy="19490"/>
           </a:xfrm>
           <a:prstGeom prst="straightConnector1">
             <a:avLst/>
           </a:prstGeom>
-          <a:ln>
-            <a:tailEnd type="triangle"/>
+          <a:ln w="76200">
+            <a:solidFill>
+              <a:schemeClr val="accent3"/>
+            </a:solidFill>
+            <a:tailEnd type="stealth"/>
           </a:ln>
         </p:spPr>
         <p:style>
@@ -18768,20 +19050,24 @@
         <p:nvCxnSpPr>
           <p:cNvPr id="29" name="Straight Arrow Connector 28"/>
           <p:cNvCxnSpPr>
+            <a:stCxn id="8" idx="1"/>
             <a:endCxn id="25" idx="0"/>
           </p:cNvCxnSpPr>
           <p:nvPr/>
         </p:nvCxnSpPr>
         <p:spPr>
-          <a:xfrm>
-            <a:off x="6265846" y="4523651"/>
-            <a:ext cx="2751" cy="256902"/>
+          <a:xfrm flipH="1">
+            <a:off x="4750619" y="5121304"/>
+            <a:ext cx="41896" cy="278616"/>
           </a:xfrm>
           <a:prstGeom prst="straightConnector1">
             <a:avLst/>
           </a:prstGeom>
-          <a:ln>
-            <a:tailEnd type="triangle"/>
+          <a:ln w="76200">
+            <a:solidFill>
+              <a:schemeClr val="accent3"/>
+            </a:solidFill>
+            <a:tailEnd type="stealth"/>
           </a:ln>
         </p:spPr>
         <p:style>
@@ -18802,25 +19088,25 @@
       <p:cxnSp>
         <p:nvCxnSpPr>
           <p:cNvPr id="16" name="Elbow Connector 15"/>
-          <p:cNvCxnSpPr>
-            <a:stCxn id="25" idx="2"/>
-            <a:endCxn id="40" idx="1"/>
-          </p:cNvCxnSpPr>
+          <p:cNvCxnSpPr/>
           <p:nvPr/>
         </p:nvCxnSpPr>
         <p:spPr>
           <a:xfrm rot="5400000" flipH="1">
-            <a:off x="1368042" y="785218"/>
-            <a:ext cx="4761408" cy="5039702"/>
+            <a:off x="124291" y="1622108"/>
+            <a:ext cx="5418624" cy="3881504"/>
           </a:xfrm>
           <a:prstGeom prst="bentConnector4">
             <a:avLst>
-              <a:gd name="adj1" fmla="val -4801"/>
-              <a:gd name="adj2" fmla="val 104536"/>
+              <a:gd name="adj1" fmla="val -4219"/>
+              <a:gd name="adj2" fmla="val 109030"/>
             </a:avLst>
           </a:prstGeom>
-          <a:ln>
-            <a:tailEnd type="triangle"/>
+          <a:ln w="76200">
+            <a:solidFill>
+              <a:schemeClr val="accent3"/>
+            </a:solidFill>
+            <a:tailEnd type="stealth"/>
           </a:ln>
         </p:spPr>
         <p:style>
@@ -18848,15 +19134,18 @@
           <p:nvPr/>
         </p:nvCxnSpPr>
         <p:spPr>
-          <a:xfrm flipH="1">
-            <a:off x="6180533" y="1446651"/>
-            <a:ext cx="35619" cy="591428"/>
+          <a:xfrm>
+            <a:off x="4792515" y="1284072"/>
+            <a:ext cx="0" cy="422884"/>
           </a:xfrm>
           <a:prstGeom prst="straightConnector1">
             <a:avLst/>
           </a:prstGeom>
-          <a:ln>
-            <a:tailEnd type="triangle"/>
+          <a:ln w="76200">
+            <a:solidFill>
+              <a:schemeClr val="accent3"/>
+            </a:solidFill>
+            <a:tailEnd type="stealth"/>
           </a:ln>
         </p:spPr>
         <p:style>
@@ -18882,13 +19171,16 @@
         </p:nvSpPr>
         <p:spPr>
           <a:xfrm>
-            <a:off x="6216152" y="1673033"/>
-            <a:ext cx="720838" cy="461665"/>
+            <a:off x="4976537" y="1284887"/>
+            <a:ext cx="697627" cy="369332"/>
           </a:xfrm>
           <a:prstGeom prst="rect">
             <a:avLst/>
           </a:prstGeom>
           <a:noFill/>
+          <a:ln>
+            <a:noFill/>
+          </a:ln>
         </p:spPr>
         <p:txBody>
           <a:bodyPr wrap="none" rtlCol="0">
@@ -18897,10 +19189,18 @@
           <a:lstStyle/>
           <a:p>
             <a:r>
-              <a:rPr lang="en-US" sz="2400" smtClean="0"/>
+              <a:rPr lang="en-US" b="1" smtClean="0">
+                <a:latin typeface="Helvetica" charset="0"/>
+                <a:ea typeface="Helvetica" charset="0"/>
+                <a:cs typeface="Helvetica" charset="0"/>
+              </a:rPr>
               <a:t>calls</a:t>
             </a:r>
-            <a:endParaRPr lang="en-US" sz="2400"/>
+            <a:endParaRPr lang="en-US" b="1">
+              <a:latin typeface="Helvetica" charset="0"/>
+              <a:ea typeface="Helvetica" charset="0"/>
+              <a:cs typeface="Helvetica" charset="0"/>
+            </a:endParaRPr>
           </a:p>
         </p:txBody>
       </p:sp>
@@ -18912,13 +19212,16 @@
         </p:nvSpPr>
         <p:spPr>
           <a:xfrm>
-            <a:off x="6297342" y="4518542"/>
-            <a:ext cx="1092415" cy="461665"/>
+            <a:off x="5241785" y="5267186"/>
+            <a:ext cx="992579" cy="369332"/>
           </a:xfrm>
           <a:prstGeom prst="rect">
             <a:avLst/>
           </a:prstGeom>
           <a:noFill/>
+          <a:ln>
+            <a:noFill/>
+          </a:ln>
         </p:spPr>
         <p:txBody>
           <a:bodyPr wrap="none" rtlCol="0">
@@ -18927,40 +19230,18 @@
           <a:lstStyle/>
           <a:p>
             <a:r>
-              <a:rPr lang="en-US" sz="2400" dirty="0" smtClean="0"/>
+              <a:rPr lang="en-US" b="1" dirty="0" smtClean="0">
+                <a:latin typeface="Helvetica" charset="0"/>
+                <a:ea typeface="Helvetica" charset="0"/>
+                <a:cs typeface="Helvetica" charset="0"/>
+              </a:rPr>
               <a:t>verifies</a:t>
             </a:r>
-            <a:endParaRPr lang="en-US" sz="2400" dirty="0"/>
-          </a:p>
-        </p:txBody>
-      </p:sp>
-      <p:sp>
-        <p:nvSpPr>
-          <p:cNvPr id="59" name="TextBox 58"/>
-          <p:cNvSpPr txBox="1"/>
-          <p:nvPr/>
-        </p:nvSpPr>
-        <p:spPr>
-          <a:xfrm>
-            <a:off x="6180532" y="3057026"/>
-            <a:ext cx="1338700" cy="461665"/>
-          </a:xfrm>
-          <a:prstGeom prst="rect">
-            <a:avLst/>
-          </a:prstGeom>
-          <a:noFill/>
-        </p:spPr>
-        <p:txBody>
-          <a:bodyPr wrap="none" rtlCol="0">
-            <a:spAutoFit/>
-          </a:bodyPr>
-          <a:lstStyle/>
-          <a:p>
-            <a:r>
-              <a:rPr lang="en-US" sz="2400" dirty="0" smtClean="0"/>
-              <a:t>produces</a:t>
-            </a:r>
-            <a:endParaRPr lang="en-US" sz="2400" dirty="0"/>
+            <a:endParaRPr lang="en-US" b="1" dirty="0">
+              <a:latin typeface="Helvetica" charset="0"/>
+              <a:ea typeface="Helvetica" charset="0"/>
+              <a:cs typeface="Helvetica" charset="0"/>
+            </a:endParaRPr>
           </a:p>
         </p:txBody>
       </p:sp>
@@ -18972,7 +19253,7 @@
         </p:nvSpPr>
         <p:spPr>
           <a:xfrm>
-            <a:off x="1228895" y="415801"/>
+            <a:off x="869115" y="377952"/>
             <a:ext cx="1964487" cy="1017128"/>
           </a:xfrm>
           <a:prstGeom prst="roundRect">
@@ -19000,6 +19281,18 @@
             </a:gsLst>
             <a:lin ang="16200000" scaled="1"/>
           </a:gradFill>
+          <a:ln>
+            <a:solidFill>
+              <a:schemeClr val="accent1"/>
+            </a:solidFill>
+          </a:ln>
+          <a:effectLst>
+            <a:outerShdw blurRad="50800" dist="38100" dir="2700000" algn="tl" rotWithShape="0">
+              <a:prstClr val="black">
+                <a:alpha val="40000"/>
+              </a:prstClr>
+            </a:outerShdw>
+          </a:effectLst>
         </p:spPr>
         <p:style>
           <a:lnRef idx="2">
@@ -19023,21 +19316,344 @@
           <a:p>
             <a:pPr algn="ctr"/>
             <a:r>
-              <a:rPr lang="en-US" sz="2400" dirty="0" smtClean="0">
+              <a:rPr lang="en-US" b="1" dirty="0">
                 <a:solidFill>
                   <a:sysClr val="windowText" lastClr="000000"/>
                 </a:solidFill>
+                <a:latin typeface="Helvetica" charset="0"/>
+                <a:ea typeface="Helvetica" charset="0"/>
+                <a:cs typeface="Helvetica" charset="0"/>
               </a:rPr>
-              <a:t>modification</a:t>
+              <a:t>d</a:t>
             </a:r>
-            <a:endParaRPr lang="en-US" sz="2400" dirty="0">
+            <a:r>
+              <a:rPr lang="en-US" b="1" dirty="0" smtClean="0">
+                <a:solidFill>
+                  <a:sysClr val="windowText" lastClr="000000"/>
+                </a:solidFill>
+                <a:latin typeface="Helvetica" charset="0"/>
+                <a:ea typeface="Helvetica" charset="0"/>
+                <a:cs typeface="Helvetica" charset="0"/>
+              </a:rPr>
+              <a:t>esign &amp; modification</a:t>
+            </a:r>
+            <a:endParaRPr lang="en-US" b="1" dirty="0">
               <a:solidFill>
                 <a:sysClr val="windowText" lastClr="000000"/>
               </a:solidFill>
+              <a:latin typeface="Helvetica" charset="0"/>
+              <a:ea typeface="Helvetica" charset="0"/>
+              <a:cs typeface="Helvetica" charset="0"/>
             </a:endParaRPr>
           </a:p>
         </p:txBody>
       </p:sp>
+      <p:grpSp>
+        <p:nvGrpSpPr>
+          <p:cNvPr id="93" name="Group 92"/>
+          <p:cNvGrpSpPr/>
+          <p:nvPr/>
+        </p:nvGrpSpPr>
+        <p:grpSpPr>
+          <a:xfrm>
+            <a:off x="3962211" y="2842875"/>
+            <a:ext cx="1660608" cy="719985"/>
+            <a:chOff x="1202712" y="4241283"/>
+            <a:chExt cx="1846212" cy="1200038"/>
+          </a:xfrm>
+        </p:grpSpPr>
+        <p:sp>
+          <p:nvSpPr>
+            <p:cNvPr id="94" name="Rounded Rectangle 93"/>
+            <p:cNvSpPr/>
+            <p:nvPr/>
+          </p:nvSpPr>
+          <p:spPr>
+            <a:xfrm>
+              <a:off x="1202712" y="4241283"/>
+              <a:ext cx="1846212" cy="1200038"/>
+            </a:xfrm>
+            <a:prstGeom prst="roundRect">
+              <a:avLst/>
+            </a:prstGeom>
+            <a:gradFill flip="none" rotWithShape="1">
+              <a:gsLst>
+                <a:gs pos="0">
+                  <a:schemeClr val="accent2">
+                    <a:lumMod val="67000"/>
+                  </a:schemeClr>
+                </a:gs>
+                <a:gs pos="48000">
+                  <a:schemeClr val="accent2">
+                    <a:lumMod val="97000"/>
+                    <a:lumOff val="3000"/>
+                  </a:schemeClr>
+                </a:gs>
+                <a:gs pos="100000">
+                  <a:schemeClr val="accent2">
+                    <a:lumMod val="60000"/>
+                    <a:lumOff val="40000"/>
+                  </a:schemeClr>
+                </a:gs>
+              </a:gsLst>
+              <a:lin ang="16200000" scaled="1"/>
+              <a:tileRect/>
+            </a:gradFill>
+            <a:effectLst>
+              <a:outerShdw blurRad="50800" dist="38100" dir="2700000" algn="tl" rotWithShape="0">
+                <a:prstClr val="black">
+                  <a:alpha val="40000"/>
+                </a:prstClr>
+              </a:outerShdw>
+            </a:effectLst>
+          </p:spPr>
+          <p:style>
+            <a:lnRef idx="0">
+              <a:schemeClr val="lt1">
+                <a:hueOff val="0"/>
+                <a:satOff val="0"/>
+                <a:lumOff val="0"/>
+                <a:alphaOff val="0"/>
+              </a:schemeClr>
+            </a:lnRef>
+            <a:fillRef idx="3">
+              <a:scrgbClr r="0" g="0" b="0"/>
+            </a:fillRef>
+            <a:effectRef idx="2">
+              <a:scrgbClr r="0" g="0" b="0"/>
+            </a:effectRef>
+            <a:fontRef idx="minor">
+              <a:schemeClr val="lt1"/>
+            </a:fontRef>
+          </p:style>
+        </p:sp>
+        <p:sp>
+          <p:nvSpPr>
+            <p:cNvPr id="95" name="Rounded Rectangle 4"/>
+            <p:cNvSpPr/>
+            <p:nvPr/>
+          </p:nvSpPr>
+          <p:spPr>
+            <a:xfrm>
+              <a:off x="1261293" y="4299864"/>
+              <a:ext cx="1729050" cy="1082876"/>
+            </a:xfrm>
+            <a:prstGeom prst="rect">
+              <a:avLst/>
+            </a:prstGeom>
+          </p:spPr>
+          <p:style>
+            <a:lnRef idx="0">
+              <a:scrgbClr r="0" g="0" b="0"/>
+            </a:lnRef>
+            <a:fillRef idx="0">
+              <a:scrgbClr r="0" g="0" b="0"/>
+            </a:fillRef>
+            <a:effectRef idx="0">
+              <a:scrgbClr r="0" g="0" b="0"/>
+            </a:effectRef>
+            <a:fontRef idx="minor">
+              <a:schemeClr val="lt1"/>
+            </a:fontRef>
+          </p:style>
+          <p:txBody>
+            <a:bodyPr spcFirstLastPara="0" vert="horz" wrap="square" lIns="87630" tIns="87630" rIns="87630" bIns="87630" numCol="1" spcCol="1270" anchor="ctr" anchorCtr="0">
+              <a:noAutofit/>
+            </a:bodyPr>
+            <a:lstStyle/>
+            <a:p>
+              <a:pPr lvl="0" algn="ctr" defTabSz="1022350">
+                <a:lnSpc>
+                  <a:spcPct val="90000"/>
+                </a:lnSpc>
+                <a:spcBef>
+                  <a:spcPct val="0"/>
+                </a:spcBef>
+                <a:spcAft>
+                  <a:spcPct val="35000"/>
+                </a:spcAft>
+              </a:pPr>
+              <a:r>
+                <a:rPr lang="en-US" b="1" kern="1200" dirty="0" smtClean="0">
+                  <a:solidFill>
+                    <a:schemeClr val="tx1"/>
+                  </a:solidFill>
+                  <a:latin typeface="Helvetica" charset="0"/>
+                  <a:ea typeface="Helvetica" charset="0"/>
+                  <a:cs typeface="Helvetica" charset="0"/>
+                </a:rPr>
+                <a:t>execution</a:t>
+              </a:r>
+              <a:endParaRPr lang="en-US" b="1" kern="1200" dirty="0">
+                <a:solidFill>
+                  <a:schemeClr val="tx1"/>
+                </a:solidFill>
+                <a:latin typeface="Helvetica" charset="0"/>
+                <a:ea typeface="Helvetica" charset="0"/>
+                <a:cs typeface="Helvetica" charset="0"/>
+              </a:endParaRPr>
+            </a:p>
+          </p:txBody>
+        </p:sp>
+      </p:grpSp>
+      <p:cxnSp>
+        <p:nvCxnSpPr>
+          <p:cNvPr id="103" name="Straight Arrow Connector 102"/>
+          <p:cNvCxnSpPr>
+            <a:stCxn id="94" idx="2"/>
+            <a:endCxn id="8" idx="3"/>
+          </p:cNvCxnSpPr>
+          <p:nvPr/>
+        </p:nvCxnSpPr>
+        <p:spPr>
+          <a:xfrm>
+            <a:off x="4792515" y="3562860"/>
+            <a:ext cx="0" cy="814666"/>
+          </a:xfrm>
+          <a:prstGeom prst="straightConnector1">
+            <a:avLst/>
+          </a:prstGeom>
+          <a:ln w="76200">
+            <a:solidFill>
+              <a:schemeClr val="accent3"/>
+            </a:solidFill>
+            <a:tailEnd type="stealth"/>
+          </a:ln>
+        </p:spPr>
+        <p:style>
+          <a:lnRef idx="1">
+            <a:schemeClr val="accent1"/>
+          </a:lnRef>
+          <a:fillRef idx="0">
+            <a:schemeClr val="accent1"/>
+          </a:fillRef>
+          <a:effectRef idx="0">
+            <a:schemeClr val="accent1"/>
+          </a:effectRef>
+          <a:fontRef idx="minor">
+            <a:schemeClr val="tx1"/>
+          </a:fontRef>
+        </p:style>
+      </p:cxnSp>
+      <p:cxnSp>
+        <p:nvCxnSpPr>
+          <p:cNvPr id="110" name="Straight Arrow Connector 109"/>
+          <p:cNvCxnSpPr>
+            <a:stCxn id="94" idx="2"/>
+            <a:endCxn id="42" idx="1"/>
+          </p:cNvCxnSpPr>
+          <p:nvPr/>
+        </p:nvCxnSpPr>
+        <p:spPr>
+          <a:xfrm>
+            <a:off x="4792515" y="3562860"/>
+            <a:ext cx="1471727" cy="219088"/>
+          </a:xfrm>
+          <a:prstGeom prst="straightConnector1">
+            <a:avLst/>
+          </a:prstGeom>
+          <a:ln w="76200">
+            <a:solidFill>
+              <a:schemeClr val="accent3"/>
+            </a:solidFill>
+            <a:tailEnd type="stealth"/>
+          </a:ln>
+        </p:spPr>
+        <p:style>
+          <a:lnRef idx="1">
+            <a:schemeClr val="accent1"/>
+          </a:lnRef>
+          <a:fillRef idx="0">
+            <a:schemeClr val="accent1"/>
+          </a:fillRef>
+          <a:effectRef idx="0">
+            <a:schemeClr val="accent1"/>
+          </a:effectRef>
+          <a:fontRef idx="minor">
+            <a:schemeClr val="tx1"/>
+          </a:fontRef>
+        </p:style>
+      </p:cxnSp>
+      <p:sp>
+        <p:nvSpPr>
+          <p:cNvPr id="59" name="TextBox 58"/>
+          <p:cNvSpPr txBox="1"/>
+          <p:nvPr/>
+        </p:nvSpPr>
+        <p:spPr>
+          <a:xfrm>
+            <a:off x="5816316" y="3302709"/>
+            <a:ext cx="1223412" cy="369332"/>
+          </a:xfrm>
+          <a:prstGeom prst="rect">
+            <a:avLst/>
+          </a:prstGeom>
+          <a:noFill/>
+          <a:ln>
+            <a:noFill/>
+          </a:ln>
+        </p:spPr>
+        <p:txBody>
+          <a:bodyPr wrap="none" rtlCol="0">
+            <a:spAutoFit/>
+          </a:bodyPr>
+          <a:lstStyle/>
+          <a:p>
+            <a:r>
+              <a:rPr lang="en-US" b="1" dirty="0" smtClean="0">
+                <a:latin typeface="Helvetica" charset="0"/>
+                <a:ea typeface="Helvetica" charset="0"/>
+                <a:cs typeface="Helvetica" charset="0"/>
+              </a:rPr>
+              <a:t>produces</a:t>
+            </a:r>
+            <a:endParaRPr lang="en-US" b="1" dirty="0">
+              <a:latin typeface="Helvetica" charset="0"/>
+              <a:ea typeface="Helvetica" charset="0"/>
+              <a:cs typeface="Helvetica" charset="0"/>
+            </a:endParaRPr>
+          </a:p>
+        </p:txBody>
+      </p:sp>
+      <p:cxnSp>
+        <p:nvCxnSpPr>
+          <p:cNvPr id="115" name="Straight Arrow Connector 114"/>
+          <p:cNvCxnSpPr>
+            <a:stCxn id="42" idx="3"/>
+            <a:endCxn id="8" idx="0"/>
+          </p:cNvCxnSpPr>
+          <p:nvPr/>
+        </p:nvCxnSpPr>
+        <p:spPr>
+          <a:xfrm flipH="1">
+            <a:off x="5622819" y="4356610"/>
+            <a:ext cx="641423" cy="392805"/>
+          </a:xfrm>
+          <a:prstGeom prst="straightConnector1">
+            <a:avLst/>
+          </a:prstGeom>
+          <a:ln w="76200">
+            <a:solidFill>
+              <a:schemeClr val="accent3"/>
+            </a:solidFill>
+            <a:tailEnd type="stealth"/>
+          </a:ln>
+        </p:spPr>
+        <p:style>
+          <a:lnRef idx="1">
+            <a:schemeClr val="accent1"/>
+          </a:lnRef>
+          <a:fillRef idx="0">
+            <a:schemeClr val="accent1"/>
+          </a:fillRef>
+          <a:effectRef idx="0">
+            <a:schemeClr val="accent1"/>
+          </a:effectRef>
+          <a:fontRef idx="minor">
+            <a:schemeClr val="tx1"/>
+          </a:fontRef>
+        </p:style>
+      </p:cxnSp>
     </p:spTree>
     <p:extLst>
       <p:ext uri="{BB962C8B-B14F-4D97-AF65-F5344CB8AC3E}">

</xml_diff>